<commit_message>
Changed z3_circle_examples.sh to z3_circle_examples.sbatch Added meaningful excel for single_edge_30_runs.xlsx
</commit_message>
<xml_diff>
--- a/rich_events/figures/regular_polygon.pptx
+++ b/rich_events/figures/regular_polygon.pptx
@@ -4073,6 +4073,692 @@
           </p:sp>
         </mc:Fallback>
       </mc:AlternateContent>
+      <p:sp>
+        <p:nvSpPr>
+          <p:cNvPr id="20" name="Oval 19">
+            <a:extLst>
+              <a:ext uri="{FF2B5EF4-FFF2-40B4-BE49-F238E27FC236}">
+                <a16:creationId xmlns:a16="http://schemas.microsoft.com/office/drawing/2014/main" id="{9ED7D993-6FA0-5526-22AB-AEA8D48382B1}"/>
+              </a:ext>
+            </a:extLst>
+          </p:cNvPr>
+          <p:cNvSpPr/>
+          <p:nvPr/>
+        </p:nvSpPr>
+        <p:spPr>
+          <a:xfrm>
+            <a:off x="5699828" y="2430559"/>
+            <a:ext cx="82011" cy="82011"/>
+          </a:xfrm>
+          <a:prstGeom prst="ellipse">
+            <a:avLst/>
+          </a:prstGeom>
+          <a:solidFill>
+            <a:srgbClr val="7030A0"/>
+          </a:solidFill>
+        </p:spPr>
+        <p:style>
+          <a:lnRef idx="2">
+            <a:schemeClr val="accent2">
+              <a:shade val="15000"/>
+            </a:schemeClr>
+          </a:lnRef>
+          <a:fillRef idx="1">
+            <a:schemeClr val="accent2"/>
+          </a:fillRef>
+          <a:effectRef idx="0">
+            <a:schemeClr val="accent2"/>
+          </a:effectRef>
+          <a:fontRef idx="minor">
+            <a:schemeClr val="lt1"/>
+          </a:fontRef>
+        </p:style>
+        <p:txBody>
+          <a:bodyPr rtlCol="0" anchor="ctr"/>
+          <a:lstStyle/>
+          <a:p>
+            <a:pPr algn="ctr"/>
+            <a:endParaRPr lang="en-US"/>
+          </a:p>
+        </p:txBody>
+      </p:sp>
+      <p:sp>
+        <p:nvSpPr>
+          <p:cNvPr id="21" name="Oval 20">
+            <a:extLst>
+              <a:ext uri="{FF2B5EF4-FFF2-40B4-BE49-F238E27FC236}">
+                <a16:creationId xmlns:a16="http://schemas.microsoft.com/office/drawing/2014/main" id="{E1E971D3-5D3F-CDD8-9068-790A1D9405C1}"/>
+              </a:ext>
+            </a:extLst>
+          </p:cNvPr>
+          <p:cNvSpPr/>
+          <p:nvPr/>
+        </p:nvSpPr>
+        <p:spPr>
+          <a:xfrm>
+            <a:off x="5852228" y="2582959"/>
+            <a:ext cx="82011" cy="82011"/>
+          </a:xfrm>
+          <a:prstGeom prst="ellipse">
+            <a:avLst/>
+          </a:prstGeom>
+          <a:solidFill>
+            <a:srgbClr val="7030A0"/>
+          </a:solidFill>
+        </p:spPr>
+        <p:style>
+          <a:lnRef idx="2">
+            <a:schemeClr val="accent2">
+              <a:shade val="15000"/>
+            </a:schemeClr>
+          </a:lnRef>
+          <a:fillRef idx="1">
+            <a:schemeClr val="accent2"/>
+          </a:fillRef>
+          <a:effectRef idx="0">
+            <a:schemeClr val="accent2"/>
+          </a:effectRef>
+          <a:fontRef idx="minor">
+            <a:schemeClr val="lt1"/>
+          </a:fontRef>
+        </p:style>
+        <p:txBody>
+          <a:bodyPr rtlCol="0" anchor="ctr"/>
+          <a:lstStyle/>
+          <a:p>
+            <a:pPr algn="ctr"/>
+            <a:endParaRPr lang="en-US"/>
+          </a:p>
+        </p:txBody>
+      </p:sp>
+      <p:sp>
+        <p:nvSpPr>
+          <p:cNvPr id="22" name="Oval 21">
+            <a:extLst>
+              <a:ext uri="{FF2B5EF4-FFF2-40B4-BE49-F238E27FC236}">
+                <a16:creationId xmlns:a16="http://schemas.microsoft.com/office/drawing/2014/main" id="{10900F2D-1461-308B-6605-132F0492A3B5}"/>
+              </a:ext>
+            </a:extLst>
+          </p:cNvPr>
+          <p:cNvSpPr/>
+          <p:nvPr/>
+        </p:nvSpPr>
+        <p:spPr>
+          <a:xfrm>
+            <a:off x="6004628" y="2735359"/>
+            <a:ext cx="82011" cy="82011"/>
+          </a:xfrm>
+          <a:prstGeom prst="ellipse">
+            <a:avLst/>
+          </a:prstGeom>
+          <a:solidFill>
+            <a:srgbClr val="7030A0"/>
+          </a:solidFill>
+        </p:spPr>
+        <p:style>
+          <a:lnRef idx="2">
+            <a:schemeClr val="accent2">
+              <a:shade val="15000"/>
+            </a:schemeClr>
+          </a:lnRef>
+          <a:fillRef idx="1">
+            <a:schemeClr val="accent2"/>
+          </a:fillRef>
+          <a:effectRef idx="0">
+            <a:schemeClr val="accent2"/>
+          </a:effectRef>
+          <a:fontRef idx="minor">
+            <a:schemeClr val="lt1"/>
+          </a:fontRef>
+        </p:style>
+        <p:txBody>
+          <a:bodyPr rtlCol="0" anchor="ctr"/>
+          <a:lstStyle/>
+          <a:p>
+            <a:pPr algn="ctr"/>
+            <a:endParaRPr lang="en-US"/>
+          </a:p>
+        </p:txBody>
+      </p:sp>
+      <p:sp>
+        <p:nvSpPr>
+          <p:cNvPr id="23" name="Oval 22">
+            <a:extLst>
+              <a:ext uri="{FF2B5EF4-FFF2-40B4-BE49-F238E27FC236}">
+                <a16:creationId xmlns:a16="http://schemas.microsoft.com/office/drawing/2014/main" id="{BD7A184B-34B6-8B0D-067C-919ABFF0CABC}"/>
+              </a:ext>
+            </a:extLst>
+          </p:cNvPr>
+          <p:cNvSpPr/>
+          <p:nvPr/>
+        </p:nvSpPr>
+        <p:spPr>
+          <a:xfrm>
+            <a:off x="6157028" y="2887759"/>
+            <a:ext cx="82011" cy="82011"/>
+          </a:xfrm>
+          <a:prstGeom prst="ellipse">
+            <a:avLst/>
+          </a:prstGeom>
+          <a:solidFill>
+            <a:srgbClr val="7030A0"/>
+          </a:solidFill>
+        </p:spPr>
+        <p:style>
+          <a:lnRef idx="2">
+            <a:schemeClr val="accent2">
+              <a:shade val="15000"/>
+            </a:schemeClr>
+          </a:lnRef>
+          <a:fillRef idx="1">
+            <a:schemeClr val="accent2"/>
+          </a:fillRef>
+          <a:effectRef idx="0">
+            <a:schemeClr val="accent2"/>
+          </a:effectRef>
+          <a:fontRef idx="minor">
+            <a:schemeClr val="lt1"/>
+          </a:fontRef>
+        </p:style>
+        <p:txBody>
+          <a:bodyPr rtlCol="0" anchor="ctr"/>
+          <a:lstStyle/>
+          <a:p>
+            <a:pPr algn="ctr"/>
+            <a:endParaRPr lang="en-US"/>
+          </a:p>
+        </p:txBody>
+      </p:sp>
+      <p:sp>
+        <p:nvSpPr>
+          <p:cNvPr id="24" name="Oval 23">
+            <a:extLst>
+              <a:ext uri="{FF2B5EF4-FFF2-40B4-BE49-F238E27FC236}">
+                <a16:creationId xmlns:a16="http://schemas.microsoft.com/office/drawing/2014/main" id="{14A1DE30-DCF0-4AE6-ED22-F60E8D65458E}"/>
+              </a:ext>
+            </a:extLst>
+          </p:cNvPr>
+          <p:cNvSpPr/>
+          <p:nvPr/>
+        </p:nvSpPr>
+        <p:spPr>
+          <a:xfrm>
+            <a:off x="6309428" y="3040159"/>
+            <a:ext cx="82011" cy="82011"/>
+          </a:xfrm>
+          <a:prstGeom prst="ellipse">
+            <a:avLst/>
+          </a:prstGeom>
+          <a:solidFill>
+            <a:srgbClr val="7030A0"/>
+          </a:solidFill>
+        </p:spPr>
+        <p:style>
+          <a:lnRef idx="2">
+            <a:schemeClr val="accent2">
+              <a:shade val="15000"/>
+            </a:schemeClr>
+          </a:lnRef>
+          <a:fillRef idx="1">
+            <a:schemeClr val="accent2"/>
+          </a:fillRef>
+          <a:effectRef idx="0">
+            <a:schemeClr val="accent2"/>
+          </a:effectRef>
+          <a:fontRef idx="minor">
+            <a:schemeClr val="lt1"/>
+          </a:fontRef>
+        </p:style>
+        <p:txBody>
+          <a:bodyPr rtlCol="0" anchor="ctr"/>
+          <a:lstStyle/>
+          <a:p>
+            <a:pPr algn="ctr"/>
+            <a:endParaRPr lang="en-US"/>
+          </a:p>
+        </p:txBody>
+      </p:sp>
+      <p:sp>
+        <p:nvSpPr>
+          <p:cNvPr id="25" name="Oval 24">
+            <a:extLst>
+              <a:ext uri="{FF2B5EF4-FFF2-40B4-BE49-F238E27FC236}">
+                <a16:creationId xmlns:a16="http://schemas.microsoft.com/office/drawing/2014/main" id="{4B4D8A86-5C9D-8A9E-BEB8-1991630E6097}"/>
+              </a:ext>
+            </a:extLst>
+          </p:cNvPr>
+          <p:cNvSpPr/>
+          <p:nvPr/>
+        </p:nvSpPr>
+        <p:spPr>
+          <a:xfrm>
+            <a:off x="6461828" y="3192559"/>
+            <a:ext cx="82011" cy="82011"/>
+          </a:xfrm>
+          <a:prstGeom prst="ellipse">
+            <a:avLst/>
+          </a:prstGeom>
+          <a:solidFill>
+            <a:srgbClr val="7030A0"/>
+          </a:solidFill>
+        </p:spPr>
+        <p:style>
+          <a:lnRef idx="2">
+            <a:schemeClr val="accent2">
+              <a:shade val="15000"/>
+            </a:schemeClr>
+          </a:lnRef>
+          <a:fillRef idx="1">
+            <a:schemeClr val="accent2"/>
+          </a:fillRef>
+          <a:effectRef idx="0">
+            <a:schemeClr val="accent2"/>
+          </a:effectRef>
+          <a:fontRef idx="minor">
+            <a:schemeClr val="lt1"/>
+          </a:fontRef>
+        </p:style>
+        <p:txBody>
+          <a:bodyPr rtlCol="0" anchor="ctr"/>
+          <a:lstStyle/>
+          <a:p>
+            <a:pPr algn="ctr"/>
+            <a:endParaRPr lang="en-US"/>
+          </a:p>
+        </p:txBody>
+      </p:sp>
+      <p:sp>
+        <p:nvSpPr>
+          <p:cNvPr id="26" name="Oval 25">
+            <a:extLst>
+              <a:ext uri="{FF2B5EF4-FFF2-40B4-BE49-F238E27FC236}">
+                <a16:creationId xmlns:a16="http://schemas.microsoft.com/office/drawing/2014/main" id="{0F6C721D-ECD5-F53A-6E74-69511DB65D3E}"/>
+              </a:ext>
+            </a:extLst>
+          </p:cNvPr>
+          <p:cNvSpPr/>
+          <p:nvPr/>
+        </p:nvSpPr>
+        <p:spPr>
+          <a:xfrm>
+            <a:off x="6614228" y="3344959"/>
+            <a:ext cx="82011" cy="82011"/>
+          </a:xfrm>
+          <a:prstGeom prst="ellipse">
+            <a:avLst/>
+          </a:prstGeom>
+          <a:solidFill>
+            <a:srgbClr val="7030A0"/>
+          </a:solidFill>
+        </p:spPr>
+        <p:style>
+          <a:lnRef idx="2">
+            <a:schemeClr val="accent2">
+              <a:shade val="15000"/>
+            </a:schemeClr>
+          </a:lnRef>
+          <a:fillRef idx="1">
+            <a:schemeClr val="accent2"/>
+          </a:fillRef>
+          <a:effectRef idx="0">
+            <a:schemeClr val="accent2"/>
+          </a:effectRef>
+          <a:fontRef idx="minor">
+            <a:schemeClr val="lt1"/>
+          </a:fontRef>
+        </p:style>
+        <p:txBody>
+          <a:bodyPr rtlCol="0" anchor="ctr"/>
+          <a:lstStyle/>
+          <a:p>
+            <a:pPr algn="ctr"/>
+            <a:endParaRPr lang="en-US"/>
+          </a:p>
+        </p:txBody>
+      </p:sp>
+      <p:sp>
+        <p:nvSpPr>
+          <p:cNvPr id="27" name="Oval 26">
+            <a:extLst>
+              <a:ext uri="{FF2B5EF4-FFF2-40B4-BE49-F238E27FC236}">
+                <a16:creationId xmlns:a16="http://schemas.microsoft.com/office/drawing/2014/main" id="{04CA00F5-E33A-5956-8862-9A0C0F18389C}"/>
+              </a:ext>
+            </a:extLst>
+          </p:cNvPr>
+          <p:cNvSpPr/>
+          <p:nvPr/>
+        </p:nvSpPr>
+        <p:spPr>
+          <a:xfrm>
+            <a:off x="6766628" y="3497359"/>
+            <a:ext cx="82011" cy="82011"/>
+          </a:xfrm>
+          <a:prstGeom prst="ellipse">
+            <a:avLst/>
+          </a:prstGeom>
+          <a:solidFill>
+            <a:srgbClr val="7030A0"/>
+          </a:solidFill>
+        </p:spPr>
+        <p:style>
+          <a:lnRef idx="2">
+            <a:schemeClr val="accent2">
+              <a:shade val="15000"/>
+            </a:schemeClr>
+          </a:lnRef>
+          <a:fillRef idx="1">
+            <a:schemeClr val="accent2"/>
+          </a:fillRef>
+          <a:effectRef idx="0">
+            <a:schemeClr val="accent2"/>
+          </a:effectRef>
+          <a:fontRef idx="minor">
+            <a:schemeClr val="lt1"/>
+          </a:fontRef>
+        </p:style>
+        <p:txBody>
+          <a:bodyPr rtlCol="0" anchor="ctr"/>
+          <a:lstStyle/>
+          <a:p>
+            <a:pPr algn="ctr"/>
+            <a:endParaRPr lang="en-US"/>
+          </a:p>
+        </p:txBody>
+      </p:sp>
+      <p:sp>
+        <p:nvSpPr>
+          <p:cNvPr id="28" name="Oval 27">
+            <a:extLst>
+              <a:ext uri="{FF2B5EF4-FFF2-40B4-BE49-F238E27FC236}">
+                <a16:creationId xmlns:a16="http://schemas.microsoft.com/office/drawing/2014/main" id="{B7E0D864-EA70-C3DE-DF13-E49DACF570B4}"/>
+              </a:ext>
+            </a:extLst>
+          </p:cNvPr>
+          <p:cNvSpPr/>
+          <p:nvPr/>
+        </p:nvSpPr>
+        <p:spPr>
+          <a:xfrm>
+            <a:off x="6919028" y="3649759"/>
+            <a:ext cx="82011" cy="82011"/>
+          </a:xfrm>
+          <a:prstGeom prst="ellipse">
+            <a:avLst/>
+          </a:prstGeom>
+          <a:solidFill>
+            <a:srgbClr val="7030A0"/>
+          </a:solidFill>
+        </p:spPr>
+        <p:style>
+          <a:lnRef idx="2">
+            <a:schemeClr val="accent2">
+              <a:shade val="15000"/>
+            </a:schemeClr>
+          </a:lnRef>
+          <a:fillRef idx="1">
+            <a:schemeClr val="accent2"/>
+          </a:fillRef>
+          <a:effectRef idx="0">
+            <a:schemeClr val="accent2"/>
+          </a:effectRef>
+          <a:fontRef idx="minor">
+            <a:schemeClr val="lt1"/>
+          </a:fontRef>
+        </p:style>
+        <p:txBody>
+          <a:bodyPr rtlCol="0" anchor="ctr"/>
+          <a:lstStyle/>
+          <a:p>
+            <a:pPr algn="ctr"/>
+            <a:endParaRPr lang="en-US"/>
+          </a:p>
+        </p:txBody>
+      </p:sp>
+      <p:sp>
+        <p:nvSpPr>
+          <p:cNvPr id="29" name="Oval 28">
+            <a:extLst>
+              <a:ext uri="{FF2B5EF4-FFF2-40B4-BE49-F238E27FC236}">
+                <a16:creationId xmlns:a16="http://schemas.microsoft.com/office/drawing/2014/main" id="{107D533E-0779-C9AD-57E6-A78B90AB8C8B}"/>
+              </a:ext>
+            </a:extLst>
+          </p:cNvPr>
+          <p:cNvSpPr/>
+          <p:nvPr/>
+        </p:nvSpPr>
+        <p:spPr>
+          <a:xfrm>
+            <a:off x="6033203" y="2563909"/>
+            <a:ext cx="82011" cy="82011"/>
+          </a:xfrm>
+          <a:prstGeom prst="ellipse">
+            <a:avLst/>
+          </a:prstGeom>
+          <a:solidFill>
+            <a:srgbClr val="7030A0"/>
+          </a:solidFill>
+        </p:spPr>
+        <p:style>
+          <a:lnRef idx="2">
+            <a:schemeClr val="accent2">
+              <a:shade val="15000"/>
+            </a:schemeClr>
+          </a:lnRef>
+          <a:fillRef idx="1">
+            <a:schemeClr val="accent2"/>
+          </a:fillRef>
+          <a:effectRef idx="0">
+            <a:schemeClr val="accent2"/>
+          </a:effectRef>
+          <a:fontRef idx="minor">
+            <a:schemeClr val="lt1"/>
+          </a:fontRef>
+        </p:style>
+        <p:txBody>
+          <a:bodyPr rtlCol="0" anchor="ctr"/>
+          <a:lstStyle/>
+          <a:p>
+            <a:pPr algn="ctr"/>
+            <a:endParaRPr lang="en-US"/>
+          </a:p>
+        </p:txBody>
+      </p:sp>
+      <p:sp>
+        <p:nvSpPr>
+          <p:cNvPr id="30" name="Oval 29">
+            <a:extLst>
+              <a:ext uri="{FF2B5EF4-FFF2-40B4-BE49-F238E27FC236}">
+                <a16:creationId xmlns:a16="http://schemas.microsoft.com/office/drawing/2014/main" id="{07E871DA-C09C-6D4A-362D-EB5BE7BB1AE2}"/>
+              </a:ext>
+            </a:extLst>
+          </p:cNvPr>
+          <p:cNvSpPr/>
+          <p:nvPr/>
+        </p:nvSpPr>
+        <p:spPr>
+          <a:xfrm>
+            <a:off x="6233228" y="2697259"/>
+            <a:ext cx="82011" cy="82011"/>
+          </a:xfrm>
+          <a:prstGeom prst="ellipse">
+            <a:avLst/>
+          </a:prstGeom>
+          <a:solidFill>
+            <a:srgbClr val="7030A0"/>
+          </a:solidFill>
+        </p:spPr>
+        <p:style>
+          <a:lnRef idx="2">
+            <a:schemeClr val="accent2">
+              <a:shade val="15000"/>
+            </a:schemeClr>
+          </a:lnRef>
+          <a:fillRef idx="1">
+            <a:schemeClr val="accent2"/>
+          </a:fillRef>
+          <a:effectRef idx="0">
+            <a:schemeClr val="accent2"/>
+          </a:effectRef>
+          <a:fontRef idx="minor">
+            <a:schemeClr val="lt1"/>
+          </a:fontRef>
+        </p:style>
+        <p:txBody>
+          <a:bodyPr rtlCol="0" anchor="ctr"/>
+          <a:lstStyle/>
+          <a:p>
+            <a:pPr algn="ctr"/>
+            <a:endParaRPr lang="en-US"/>
+          </a:p>
+        </p:txBody>
+      </p:sp>
+      <p:sp>
+        <p:nvSpPr>
+          <p:cNvPr id="31" name="Oval 30">
+            <a:extLst>
+              <a:ext uri="{FF2B5EF4-FFF2-40B4-BE49-F238E27FC236}">
+                <a16:creationId xmlns:a16="http://schemas.microsoft.com/office/drawing/2014/main" id="{434EEDEE-9FC2-7EAE-EA9A-BC83CFDDF5EB}"/>
+              </a:ext>
+            </a:extLst>
+          </p:cNvPr>
+          <p:cNvSpPr/>
+          <p:nvPr/>
+        </p:nvSpPr>
+        <p:spPr>
+          <a:xfrm>
+            <a:off x="6395153" y="2878234"/>
+            <a:ext cx="82011" cy="82011"/>
+          </a:xfrm>
+          <a:prstGeom prst="ellipse">
+            <a:avLst/>
+          </a:prstGeom>
+          <a:solidFill>
+            <a:srgbClr val="7030A0"/>
+          </a:solidFill>
+        </p:spPr>
+        <p:style>
+          <a:lnRef idx="2">
+            <a:schemeClr val="accent2">
+              <a:shade val="15000"/>
+            </a:schemeClr>
+          </a:lnRef>
+          <a:fillRef idx="1">
+            <a:schemeClr val="accent2"/>
+          </a:fillRef>
+          <a:effectRef idx="0">
+            <a:schemeClr val="accent2"/>
+          </a:effectRef>
+          <a:fontRef idx="minor">
+            <a:schemeClr val="lt1"/>
+          </a:fontRef>
+        </p:style>
+        <p:txBody>
+          <a:bodyPr rtlCol="0" anchor="ctr"/>
+          <a:lstStyle/>
+          <a:p>
+            <a:pPr algn="ctr"/>
+            <a:endParaRPr lang="en-US"/>
+          </a:p>
+        </p:txBody>
+      </p:sp>
+      <p:sp>
+        <p:nvSpPr>
+          <p:cNvPr id="32" name="Oval 31">
+            <a:extLst>
+              <a:ext uri="{FF2B5EF4-FFF2-40B4-BE49-F238E27FC236}">
+                <a16:creationId xmlns:a16="http://schemas.microsoft.com/office/drawing/2014/main" id="{6AE6517C-FDB2-4224-0A70-8D83B0CD9D4C}"/>
+              </a:ext>
+            </a:extLst>
+          </p:cNvPr>
+          <p:cNvSpPr/>
+          <p:nvPr/>
+        </p:nvSpPr>
+        <p:spPr>
+          <a:xfrm>
+            <a:off x="6576128" y="3068734"/>
+            <a:ext cx="82011" cy="82011"/>
+          </a:xfrm>
+          <a:prstGeom prst="ellipse">
+            <a:avLst/>
+          </a:prstGeom>
+          <a:solidFill>
+            <a:srgbClr val="7030A0"/>
+          </a:solidFill>
+        </p:spPr>
+        <p:style>
+          <a:lnRef idx="2">
+            <a:schemeClr val="accent2">
+              <a:shade val="15000"/>
+            </a:schemeClr>
+          </a:lnRef>
+          <a:fillRef idx="1">
+            <a:schemeClr val="accent2"/>
+          </a:fillRef>
+          <a:effectRef idx="0">
+            <a:schemeClr val="accent2"/>
+          </a:effectRef>
+          <a:fontRef idx="minor">
+            <a:schemeClr val="lt1"/>
+          </a:fontRef>
+        </p:style>
+        <p:txBody>
+          <a:bodyPr rtlCol="0" anchor="ctr"/>
+          <a:lstStyle/>
+          <a:p>
+            <a:pPr algn="ctr"/>
+            <a:endParaRPr lang="en-US"/>
+          </a:p>
+        </p:txBody>
+      </p:sp>
+      <p:sp>
+        <p:nvSpPr>
+          <p:cNvPr id="33" name="Oval 32">
+            <a:extLst>
+              <a:ext uri="{FF2B5EF4-FFF2-40B4-BE49-F238E27FC236}">
+                <a16:creationId xmlns:a16="http://schemas.microsoft.com/office/drawing/2014/main" id="{F924CE46-DA71-B2B2-5406-415A864D8F5E}"/>
+              </a:ext>
+            </a:extLst>
+          </p:cNvPr>
+          <p:cNvSpPr/>
+          <p:nvPr/>
+        </p:nvSpPr>
+        <p:spPr>
+          <a:xfrm>
+            <a:off x="6747578" y="3240184"/>
+            <a:ext cx="82011" cy="82011"/>
+          </a:xfrm>
+          <a:prstGeom prst="ellipse">
+            <a:avLst/>
+          </a:prstGeom>
+          <a:solidFill>
+            <a:srgbClr val="7030A0"/>
+          </a:solidFill>
+        </p:spPr>
+        <p:style>
+          <a:lnRef idx="2">
+            <a:schemeClr val="accent2">
+              <a:shade val="15000"/>
+            </a:schemeClr>
+          </a:lnRef>
+          <a:fillRef idx="1">
+            <a:schemeClr val="accent2"/>
+          </a:fillRef>
+          <a:effectRef idx="0">
+            <a:schemeClr val="accent2"/>
+          </a:effectRef>
+          <a:fontRef idx="minor">
+            <a:schemeClr val="lt1"/>
+          </a:fontRef>
+        </p:style>
+        <p:txBody>
+          <a:bodyPr rtlCol="0" anchor="ctr"/>
+          <a:lstStyle/>
+          <a:p>
+            <a:pPr algn="ctr"/>
+            <a:endParaRPr lang="en-US"/>
+          </a:p>
+        </p:txBody>
+      </p:sp>
     </p:spTree>
     <p:extLst>
       <p:ext uri="{BB962C8B-B14F-4D97-AF65-F5344CB8AC3E}">

</xml_diff>